<commit_message>
finished formal documentation for Part 4
</commit_message>
<xml_diff>
--- a/ProjectDocumentation/M4hjong.pptx
+++ b/ProjectDocumentation/M4hjong.pptx
@@ -213,7 +213,7 @@
           <a:effectLst/>
           <a:extLst>
             <a:ext uri="{91240B29-F687-4f45-9708-019B960494DF}">
-              <a14:hiddenLine xmlns="" xmlns:a14="http://schemas.microsoft.com/office/drawing/2010/main" w="9525">
+              <a14:hiddenLine xmlns:a14="http://schemas.microsoft.com/office/drawing/2010/main" xmlns="" w="9525">
                 <a:solidFill>
                   <a:srgbClr val="000000"/>
                 </a:solidFill>
@@ -405,7 +405,7 @@
           <a:p>
             <a:fld id="{F6F99430-91D6-4679-A776-697FD8BDCC50}" type="datetimeFigureOut">
               <a:rPr lang="en-US" smtClean="0"/>
-              <a:t>4/27/2014</a:t>
+              <a:t>4/28/2014</a:t>
             </a:fld>
             <a:endParaRPr lang="en-US"/>
           </a:p>
@@ -723,7 +723,7 @@
           <a:p>
             <a:fld id="{F6F99430-91D6-4679-A776-697FD8BDCC50}" type="datetimeFigureOut">
               <a:rPr lang="en-US" smtClean="0"/>
-              <a:t>4/27/2014</a:t>
+              <a:t>4/28/2014</a:t>
             </a:fld>
             <a:endParaRPr lang="en-US"/>
           </a:p>
@@ -1211,7 +1211,7 @@
           <a:p>
             <a:fld id="{F6F99430-91D6-4679-A776-697FD8BDCC50}" type="datetimeFigureOut">
               <a:rPr lang="en-US" smtClean="0"/>
-              <a:t>4/27/2014</a:t>
+              <a:t>4/28/2014</a:t>
             </a:fld>
             <a:endParaRPr lang="en-US"/>
           </a:p>
@@ -1580,7 +1580,7 @@
           <a:p>
             <a:fld id="{F6F99430-91D6-4679-A776-697FD8BDCC50}" type="datetimeFigureOut">
               <a:rPr lang="en-US" smtClean="0"/>
-              <a:t>4/27/2014</a:t>
+              <a:t>4/28/2014</a:t>
             </a:fld>
             <a:endParaRPr lang="en-US"/>
           </a:p>
@@ -1735,7 +1735,7 @@
           <a:ln/>
           <a:extLst>
             <a:ext uri="{91240B29-F687-4f45-9708-019B960494DF}">
-              <a14:hiddenLine xmlns="" xmlns:a14="http://schemas.microsoft.com/office/drawing/2010/main" w="9525">
+              <a14:hiddenLine xmlns:a14="http://schemas.microsoft.com/office/drawing/2010/main" xmlns="" w="9525">
                 <a:solidFill>
                   <a:srgbClr val="000000"/>
                 </a:solidFill>
@@ -1853,7 +1853,7 @@
           <a:p>
             <a:fld id="{F6F99430-91D6-4679-A776-697FD8BDCC50}" type="datetimeFigureOut">
               <a:rPr lang="en-US" smtClean="0"/>
-              <a:t>4/27/2014</a:t>
+              <a:t>4/28/2014</a:t>
             </a:fld>
             <a:endParaRPr lang="en-US"/>
           </a:p>
@@ -2010,7 +2010,7 @@
           <a:ln/>
           <a:extLst>
             <a:ext uri="{91240B29-F687-4f45-9708-019B960494DF}">
-              <a14:hiddenLine xmlns="" xmlns:a14="http://schemas.microsoft.com/office/drawing/2010/main" w="9525">
+              <a14:hiddenLine xmlns:a14="http://schemas.microsoft.com/office/drawing/2010/main" xmlns="" w="9525">
                 <a:solidFill>
                   <a:srgbClr val="000000"/>
                 </a:solidFill>
@@ -2138,7 +2138,7 @@
           <a:p>
             <a:fld id="{F6F99430-91D6-4679-A776-697FD8BDCC50}" type="datetimeFigureOut">
               <a:rPr lang="en-US" smtClean="0"/>
-              <a:t>4/27/2014</a:t>
+              <a:t>4/28/2014</a:t>
             </a:fld>
             <a:endParaRPr lang="en-US"/>
           </a:p>
@@ -2293,7 +2293,7 @@
           <a:ln/>
           <a:extLst>
             <a:ext uri="{91240B29-F687-4f45-9708-019B960494DF}">
-              <a14:hiddenLine xmlns="" xmlns:a14="http://schemas.microsoft.com/office/drawing/2010/main" w="9525">
+              <a14:hiddenLine xmlns:a14="http://schemas.microsoft.com/office/drawing/2010/main" xmlns="" w="9525">
                 <a:solidFill>
                   <a:srgbClr val="000000"/>
                 </a:solidFill>
@@ -2421,7 +2421,7 @@
           <a:p>
             <a:fld id="{F6F99430-91D6-4679-A776-697FD8BDCC50}" type="datetimeFigureOut">
               <a:rPr lang="en-US" smtClean="0"/>
-              <a:t>4/27/2014</a:t>
+              <a:t>4/28/2014</a:t>
             </a:fld>
             <a:endParaRPr lang="en-US"/>
           </a:p>
@@ -2764,7 +2764,7 @@
           <a:p>
             <a:fld id="{F6F99430-91D6-4679-A776-697FD8BDCC50}" type="datetimeFigureOut">
               <a:rPr lang="en-US" smtClean="0"/>
-              <a:t>4/27/2014</a:t>
+              <a:t>4/28/2014</a:t>
             </a:fld>
             <a:endParaRPr lang="en-US"/>
           </a:p>
@@ -2919,7 +2919,7 @@
           <a:ln/>
           <a:extLst>
             <a:ext uri="{91240B29-F687-4f45-9708-019B960494DF}">
-              <a14:hiddenLine xmlns="" xmlns:a14="http://schemas.microsoft.com/office/drawing/2010/main" w="9525">
+              <a14:hiddenLine xmlns:a14="http://schemas.microsoft.com/office/drawing/2010/main" xmlns="" w="9525">
                 <a:solidFill>
                   <a:srgbClr val="000000"/>
                 </a:solidFill>
@@ -3103,7 +3103,7 @@
           <a:p>
             <a:fld id="{F6F99430-91D6-4679-A776-697FD8BDCC50}" type="datetimeFigureOut">
               <a:rPr lang="en-US" smtClean="0"/>
-              <a:t>4/27/2014</a:t>
+              <a:t>4/28/2014</a:t>
             </a:fld>
             <a:endParaRPr lang="en-US"/>
           </a:p>
@@ -3258,7 +3258,7 @@
           <a:ln/>
           <a:extLst>
             <a:ext uri="{91240B29-F687-4f45-9708-019B960494DF}">
-              <a14:hiddenLine xmlns="" xmlns:a14="http://schemas.microsoft.com/office/drawing/2010/main" w="9525">
+              <a14:hiddenLine xmlns:a14="http://schemas.microsoft.com/office/drawing/2010/main" xmlns="" w="9525">
                 <a:solidFill>
                   <a:srgbClr val="000000"/>
                 </a:solidFill>
@@ -3580,7 +3580,7 @@
           <a:p>
             <a:fld id="{F6F99430-91D6-4679-A776-697FD8BDCC50}" type="datetimeFigureOut">
               <a:rPr lang="en-US" smtClean="0"/>
-              <a:t>4/27/2014</a:t>
+              <a:t>4/28/2014</a:t>
             </a:fld>
             <a:endParaRPr lang="en-US"/>
           </a:p>
@@ -3735,7 +3735,7 @@
           <a:ln/>
           <a:extLst>
             <a:ext uri="{91240B29-F687-4f45-9708-019B960494DF}">
-              <a14:hiddenLine xmlns="" xmlns:a14="http://schemas.microsoft.com/office/drawing/2010/main" w="9525">
+              <a14:hiddenLine xmlns:a14="http://schemas.microsoft.com/office/drawing/2010/main" xmlns="" w="9525">
                 <a:solidFill>
                   <a:srgbClr val="000000"/>
                 </a:solidFill>
@@ -3801,7 +3801,7 @@
           <a:p>
             <a:fld id="{F6F99430-91D6-4679-A776-697FD8BDCC50}" type="datetimeFigureOut">
               <a:rPr lang="en-US" smtClean="0"/>
-              <a:t>4/27/2014</a:t>
+              <a:t>4/28/2014</a:t>
             </a:fld>
             <a:endParaRPr lang="en-US"/>
           </a:p>
@@ -3896,7 +3896,7 @@
           <a:p>
             <a:fld id="{F6F99430-91D6-4679-A776-697FD8BDCC50}" type="datetimeFigureOut">
               <a:rPr lang="en-US" smtClean="0"/>
-              <a:t>4/27/2014</a:t>
+              <a:t>4/28/2014</a:t>
             </a:fld>
             <a:endParaRPr lang="en-US"/>
           </a:p>
@@ -4164,7 +4164,7 @@
           <a:ln/>
           <a:extLst>
             <a:ext uri="{91240B29-F687-4f45-9708-019B960494DF}">
-              <a14:hiddenLine xmlns="" xmlns:a14="http://schemas.microsoft.com/office/drawing/2010/main" w="9525">
+              <a14:hiddenLine xmlns:a14="http://schemas.microsoft.com/office/drawing/2010/main" xmlns="" w="9525">
                 <a:solidFill>
                   <a:srgbClr val="000000"/>
                 </a:solidFill>
@@ -4363,7 +4363,7 @@
           <a:p>
             <a:fld id="{F6F99430-91D6-4679-A776-697FD8BDCC50}" type="datetimeFigureOut">
               <a:rPr lang="en-US" smtClean="0"/>
-              <a:t>4/27/2014</a:t>
+              <a:t>4/28/2014</a:t>
             </a:fld>
             <a:endParaRPr lang="en-US"/>
           </a:p>
@@ -4676,7 +4676,7 @@
           <a:p>
             <a:fld id="{F6F99430-91D6-4679-A776-697FD8BDCC50}" type="datetimeFigureOut">
               <a:rPr lang="en-US" smtClean="0"/>
-              <a:t>4/27/2014</a:t>
+              <a:t>4/28/2014</a:t>
             </a:fld>
             <a:endParaRPr lang="en-US"/>
           </a:p>
@@ -4946,7 +4946,7 @@
           <a:p>
             <a:fld id="{F6F99430-91D6-4679-A776-697FD8BDCC50}" type="datetimeFigureOut">
               <a:rPr lang="en-US" smtClean="0"/>
-              <a:t>4/27/2014</a:t>
+              <a:t>4/28/2014</a:t>
             </a:fld>
             <a:endParaRPr lang="en-US"/>
           </a:p>
@@ -6231,7 +6231,24 @@
               <a:rPr lang="en-US" sz="3600" dirty="0" smtClean="0">
                 <a:latin typeface="Eadui" panose="03020602040604030804" pitchFamily="66" charset="0"/>
               </a:rPr>
-              <a:t>User Log In</a:t>
+              <a:t>User Can Display Rules</a:t>
+            </a:r>
+          </a:p>
+          <a:p>
+            <a:pPr marL="0" indent="0" algn="ctr">
+              <a:buNone/>
+            </a:pPr>
+            <a:r>
+              <a:rPr lang="en-US" sz="3600" dirty="0" smtClean="0">
+                <a:latin typeface="Eadui" panose="03020602040604030804" pitchFamily="66" charset="0"/>
+              </a:rPr>
+              <a:t>User </a:t>
+            </a:r>
+            <a:r>
+              <a:rPr lang="en-US" sz="3600" dirty="0" smtClean="0">
+                <a:latin typeface="Eadui" panose="03020602040604030804" pitchFamily="66" charset="0"/>
+              </a:rPr>
+              <a:t>Log In</a:t>
             </a:r>
             <a:endParaRPr lang="en-US" sz="3600" dirty="0">
               <a:latin typeface="Eadui" panose="03020602040604030804" pitchFamily="66" charset="0"/>

</xml_diff>